<commit_message>
Add situations for multi-contour
</commit_message>
<xml_diff>
--- a/Chessboard_representation.pptx
+++ b/Chessboard_representation.pptx
@@ -10,10 +10,13 @@
     <p:sldId id="257" r:id="rId4"/>
     <p:sldId id="259" r:id="rId5"/>
     <p:sldId id="263" r:id="rId6"/>
-    <p:sldId id="262" r:id="rId7"/>
-    <p:sldId id="260" r:id="rId8"/>
-    <p:sldId id="261" r:id="rId9"/>
-    <p:sldId id="264" r:id="rId10"/>
+    <p:sldId id="265" r:id="rId7"/>
+    <p:sldId id="262" r:id="rId8"/>
+    <p:sldId id="260" r:id="rId9"/>
+    <p:sldId id="261" r:id="rId10"/>
+    <p:sldId id="266" r:id="rId11"/>
+    <p:sldId id="268" r:id="rId12"/>
+    <p:sldId id="264" r:id="rId13"/>
   </p:sldIdLst>
   <p:sldSz cx="9144000" cy="6858000" type="screen4x3"/>
   <p:notesSz cx="6858000" cy="9144000"/>
@@ -251,7 +254,7 @@
           <a:p>
             <a:fld id="{A44D4E31-1A5F-434E-B13F-B00AC21FE132}" type="datetimeFigureOut">
               <a:rPr lang="en-US" smtClean="0"/>
-              <a:t>3/18/2016</a:t>
+              <a:t>3/20/2016</a:t>
             </a:fld>
             <a:endParaRPr lang="en-US"/>
           </a:p>
@@ -421,7 +424,7 @@
           <a:p>
             <a:fld id="{A44D4E31-1A5F-434E-B13F-B00AC21FE132}" type="datetimeFigureOut">
               <a:rPr lang="en-US" smtClean="0"/>
-              <a:t>3/18/2016</a:t>
+              <a:t>3/20/2016</a:t>
             </a:fld>
             <a:endParaRPr lang="en-US"/>
           </a:p>
@@ -601,7 +604,7 @@
           <a:p>
             <a:fld id="{A44D4E31-1A5F-434E-B13F-B00AC21FE132}" type="datetimeFigureOut">
               <a:rPr lang="en-US" smtClean="0"/>
-              <a:t>3/18/2016</a:t>
+              <a:t>3/20/2016</a:t>
             </a:fld>
             <a:endParaRPr lang="en-US"/>
           </a:p>
@@ -771,7 +774,7 @@
           <a:p>
             <a:fld id="{A44D4E31-1A5F-434E-B13F-B00AC21FE132}" type="datetimeFigureOut">
               <a:rPr lang="en-US" smtClean="0"/>
-              <a:t>3/18/2016</a:t>
+              <a:t>3/20/2016</a:t>
             </a:fld>
             <a:endParaRPr lang="en-US"/>
           </a:p>
@@ -1015,7 +1018,7 @@
           <a:p>
             <a:fld id="{A44D4E31-1A5F-434E-B13F-B00AC21FE132}" type="datetimeFigureOut">
               <a:rPr lang="en-US" smtClean="0"/>
-              <a:t>3/18/2016</a:t>
+              <a:t>3/20/2016</a:t>
             </a:fld>
             <a:endParaRPr lang="en-US"/>
           </a:p>
@@ -1247,7 +1250,7 @@
           <a:p>
             <a:fld id="{A44D4E31-1A5F-434E-B13F-B00AC21FE132}" type="datetimeFigureOut">
               <a:rPr lang="en-US" smtClean="0"/>
-              <a:t>3/18/2016</a:t>
+              <a:t>3/20/2016</a:t>
             </a:fld>
             <a:endParaRPr lang="en-US"/>
           </a:p>
@@ -1614,7 +1617,7 @@
           <a:p>
             <a:fld id="{A44D4E31-1A5F-434E-B13F-B00AC21FE132}" type="datetimeFigureOut">
               <a:rPr lang="en-US" smtClean="0"/>
-              <a:t>3/18/2016</a:t>
+              <a:t>3/20/2016</a:t>
             </a:fld>
             <a:endParaRPr lang="en-US"/>
           </a:p>
@@ -1732,7 +1735,7 @@
           <a:p>
             <a:fld id="{A44D4E31-1A5F-434E-B13F-B00AC21FE132}" type="datetimeFigureOut">
               <a:rPr lang="en-US" smtClean="0"/>
-              <a:t>3/18/2016</a:t>
+              <a:t>3/20/2016</a:t>
             </a:fld>
             <a:endParaRPr lang="en-US"/>
           </a:p>
@@ -1827,7 +1830,7 @@
           <a:p>
             <a:fld id="{A44D4E31-1A5F-434E-B13F-B00AC21FE132}" type="datetimeFigureOut">
               <a:rPr lang="en-US" smtClean="0"/>
-              <a:t>3/18/2016</a:t>
+              <a:t>3/20/2016</a:t>
             </a:fld>
             <a:endParaRPr lang="en-US"/>
           </a:p>
@@ -2104,7 +2107,7 @@
           <a:p>
             <a:fld id="{A44D4E31-1A5F-434E-B13F-B00AC21FE132}" type="datetimeFigureOut">
               <a:rPr lang="en-US" smtClean="0"/>
-              <a:t>3/18/2016</a:t>
+              <a:t>3/20/2016</a:t>
             </a:fld>
             <a:endParaRPr lang="en-US"/>
           </a:p>
@@ -2361,7 +2364,7 @@
           <a:p>
             <a:fld id="{A44D4E31-1A5F-434E-B13F-B00AC21FE132}" type="datetimeFigureOut">
               <a:rPr lang="en-US" smtClean="0"/>
-              <a:t>3/18/2016</a:t>
+              <a:t>3/20/2016</a:t>
             </a:fld>
             <a:endParaRPr lang="en-US"/>
           </a:p>
@@ -2574,7 +2577,7 @@
           <a:p>
             <a:fld id="{A44D4E31-1A5F-434E-B13F-B00AC21FE132}" type="datetimeFigureOut">
               <a:rPr lang="en-US" smtClean="0"/>
-              <a:t>3/18/2016</a:t>
+              <a:t>3/20/2016</a:t>
             </a:fld>
             <a:endParaRPr lang="en-US"/>
           </a:p>
@@ -4795,6 +4798,951 @@
     <p:extLst>
       <p:ext uri="{BB962C8B-B14F-4D97-AF65-F5344CB8AC3E}">
         <p14:creationId xmlns:p14="http://schemas.microsoft.com/office/powerpoint/2010/main" val="3528430654"/>
+      </p:ext>
+    </p:extLst>
+  </p:cSld>
+  <p:clrMapOvr>
+    <a:masterClrMapping/>
+  </p:clrMapOvr>
+</p:sld>
+</file>
+
+<file path=ppt/slides/slide10.xml><?xml version="1.0" encoding="utf-8"?>
+<p:sld xmlns:a="http://schemas.openxmlformats.org/drawingml/2006/main" xmlns:r="http://schemas.openxmlformats.org/officeDocument/2006/relationships" xmlns:p="http://schemas.openxmlformats.org/presentationml/2006/main">
+  <p:cSld>
+    <p:spTree>
+      <p:nvGrpSpPr>
+        <p:cNvPr id="1" name=""/>
+        <p:cNvGrpSpPr/>
+        <p:nvPr/>
+      </p:nvGrpSpPr>
+      <p:grpSpPr>
+        <a:xfrm>
+          <a:off x="0" y="0"/>
+          <a:ext cx="0" cy="0"/>
+          <a:chOff x="0" y="0"/>
+          <a:chExt cx="0" cy="0"/>
+        </a:xfrm>
+      </p:grpSpPr>
+      <p:sp>
+        <p:nvSpPr>
+          <p:cNvPr id="3" name="Content Placeholder 2"/>
+          <p:cNvSpPr>
+            <a:spLocks noGrp="1"/>
+          </p:cNvSpPr>
+          <p:nvPr>
+            <p:ph idx="1"/>
+          </p:nvPr>
+        </p:nvSpPr>
+        <p:spPr>
+          <a:xfrm>
+            <a:off x="538034" y="1216025"/>
+            <a:ext cx="7886700" cy="4351338"/>
+          </a:xfrm>
+        </p:spPr>
+        <p:txBody>
+          <a:bodyPr/>
+          <a:lstStyle/>
+          <a:p>
+            <a:pPr marL="0" indent="0">
+              <a:buNone/>
+            </a:pPr>
+            <a:r>
+              <a:rPr lang="en-US" dirty="0" smtClean="0"/>
+              <a:t>When find one tile which has three edges of the sam</a:t>
+            </a:r>
+            <a:r>
+              <a:rPr lang="en-US" dirty="0" smtClean="0"/>
+              <a:t>e color, this is an invalid move.</a:t>
+            </a:r>
+            <a:endParaRPr lang="en-US" dirty="0"/>
+          </a:p>
+        </p:txBody>
+      </p:sp>
+      <p:sp>
+        <p:nvSpPr>
+          <p:cNvPr id="4" name="Rectangle 3"/>
+          <p:cNvSpPr/>
+          <p:nvPr/>
+        </p:nvSpPr>
+        <p:spPr>
+          <a:xfrm>
+            <a:off x="154991" y="-30838"/>
+            <a:ext cx="3097195" cy="923330"/>
+          </a:xfrm>
+          <a:prstGeom prst="rect">
+            <a:avLst/>
+          </a:prstGeom>
+          <a:noFill/>
+        </p:spPr>
+        <p:txBody>
+          <a:bodyPr wrap="none" lIns="91440" tIns="45720" rIns="91440" bIns="45720">
+            <a:spAutoFit/>
+          </a:bodyPr>
+          <a:lstStyle/>
+          <a:p>
+            <a:pPr algn="ctr"/>
+            <a:r>
+              <a:rPr lang="en-US" altLang="zh-CN" sz="5400" b="1" cap="none" spc="0" dirty="0" smtClean="0">
+                <a:ln w="9525">
+                  <a:solidFill>
+                    <a:schemeClr val="bg1"/>
+                  </a:solidFill>
+                  <a:prstDash val="solid"/>
+                </a:ln>
+                <a:solidFill>
+                  <a:schemeClr val="tx1"/>
+                </a:solidFill>
+                <a:effectLst>
+                  <a:outerShdw blurRad="12700" dist="38100" dir="2700000" algn="tl" rotWithShape="0">
+                    <a:schemeClr val="bg1">
+                      <a:lumMod val="50000"/>
+                    </a:schemeClr>
+                  </a:outerShdw>
+                </a:effectLst>
+              </a:rPr>
+              <a:t> </a:t>
+            </a:r>
+            <a:r>
+              <a:rPr lang="en-US" altLang="zh-CN" sz="4000" b="1" dirty="0" smtClean="0">
+                <a:ln w="9525">
+                  <a:solidFill>
+                    <a:schemeClr val="bg1"/>
+                  </a:solidFill>
+                  <a:prstDash val="solid"/>
+                </a:ln>
+                <a:effectLst>
+                  <a:outerShdw blurRad="12700" dist="38100" dir="2700000" algn="tl" rotWithShape="0">
+                    <a:schemeClr val="bg1">
+                      <a:lumMod val="50000"/>
+                    </a:schemeClr>
+                  </a:outerShdw>
+                </a:effectLst>
+              </a:rPr>
+              <a:t>Invalid Move</a:t>
+            </a:r>
+            <a:endParaRPr lang="en-US" sz="4000" b="1" cap="none" spc="0" dirty="0">
+              <a:ln w="9525">
+                <a:solidFill>
+                  <a:schemeClr val="bg1"/>
+                </a:solidFill>
+                <a:prstDash val="solid"/>
+              </a:ln>
+              <a:solidFill>
+                <a:schemeClr val="tx1"/>
+              </a:solidFill>
+              <a:effectLst>
+                <a:outerShdw blurRad="12700" dist="38100" dir="2700000" algn="tl" rotWithShape="0">
+                  <a:schemeClr val="bg1">
+                    <a:lumMod val="50000"/>
+                  </a:schemeClr>
+                </a:outerShdw>
+              </a:effectLst>
+            </a:endParaRPr>
+          </a:p>
+        </p:txBody>
+      </p:sp>
+      <p:pic>
+        <p:nvPicPr>
+          <p:cNvPr id="2" name="Picture 1"/>
+          <p:cNvPicPr>
+            <a:picLocks noChangeAspect="1"/>
+          </p:cNvPicPr>
+          <p:nvPr/>
+        </p:nvPicPr>
+        <p:blipFill>
+          <a:blip r:embed="rId2"/>
+          <a:stretch>
+            <a:fillRect/>
+          </a:stretch>
+        </p:blipFill>
+        <p:spPr>
+          <a:xfrm>
+            <a:off x="639076" y="2434666"/>
+            <a:ext cx="1819275" cy="2828925"/>
+          </a:xfrm>
+          <a:prstGeom prst="rect">
+            <a:avLst/>
+          </a:prstGeom>
+        </p:spPr>
+      </p:pic>
+      <p:pic>
+        <p:nvPicPr>
+          <p:cNvPr id="22" name="Picture 21"/>
+          <p:cNvPicPr>
+            <a:picLocks noChangeAspect="1"/>
+          </p:cNvPicPr>
+          <p:nvPr/>
+        </p:nvPicPr>
+        <p:blipFill>
+          <a:blip r:embed="rId3"/>
+          <a:stretch>
+            <a:fillRect/>
+          </a:stretch>
+        </p:blipFill>
+        <p:spPr>
+          <a:xfrm>
+            <a:off x="4295387" y="2434666"/>
+            <a:ext cx="1838325" cy="2867025"/>
+          </a:xfrm>
+          <a:prstGeom prst="rect">
+            <a:avLst/>
+          </a:prstGeom>
+        </p:spPr>
+      </p:pic>
+      <p:cxnSp>
+        <p:nvCxnSpPr>
+          <p:cNvPr id="58" name="Straight Arrow Connector 57"/>
+          <p:cNvCxnSpPr/>
+          <p:nvPr/>
+        </p:nvCxnSpPr>
+        <p:spPr>
+          <a:xfrm>
+            <a:off x="1734019" y="3591698"/>
+            <a:ext cx="998561" cy="329513"/>
+          </a:xfrm>
+          <a:prstGeom prst="straightConnector1">
+            <a:avLst/>
+          </a:prstGeom>
+          <a:ln w="38100">
+            <a:tailEnd type="triangle"/>
+          </a:ln>
+        </p:spPr>
+        <p:style>
+          <a:lnRef idx="1">
+            <a:schemeClr val="accent2"/>
+          </a:lnRef>
+          <a:fillRef idx="0">
+            <a:schemeClr val="accent2"/>
+          </a:fillRef>
+          <a:effectRef idx="0">
+            <a:schemeClr val="accent2"/>
+          </a:effectRef>
+          <a:fontRef idx="minor">
+            <a:schemeClr val="tx1"/>
+          </a:fontRef>
+        </p:style>
+      </p:cxnSp>
+      <p:cxnSp>
+        <p:nvCxnSpPr>
+          <p:cNvPr id="64" name="Straight Arrow Connector 63"/>
+          <p:cNvCxnSpPr/>
+          <p:nvPr/>
+        </p:nvCxnSpPr>
+        <p:spPr>
+          <a:xfrm flipH="1">
+            <a:off x="3525793" y="3558746"/>
+            <a:ext cx="1449861" cy="362465"/>
+          </a:xfrm>
+          <a:prstGeom prst="straightConnector1">
+            <a:avLst/>
+          </a:prstGeom>
+          <a:ln w="38100">
+            <a:tailEnd type="triangle"/>
+          </a:ln>
+        </p:spPr>
+        <p:style>
+          <a:lnRef idx="1">
+            <a:schemeClr val="accent2"/>
+          </a:lnRef>
+          <a:fillRef idx="0">
+            <a:schemeClr val="accent2"/>
+          </a:fillRef>
+          <a:effectRef idx="0">
+            <a:schemeClr val="accent2"/>
+          </a:effectRef>
+          <a:fontRef idx="minor">
+            <a:schemeClr val="tx1"/>
+          </a:fontRef>
+        </p:style>
+      </p:cxnSp>
+      <p:sp>
+        <p:nvSpPr>
+          <p:cNvPr id="65" name="TextBox 64"/>
+          <p:cNvSpPr txBox="1"/>
+          <p:nvPr/>
+        </p:nvSpPr>
+        <p:spPr>
+          <a:xfrm>
+            <a:off x="2682185" y="3816377"/>
+            <a:ext cx="1054720" cy="923330"/>
+          </a:xfrm>
+          <a:prstGeom prst="rect">
+            <a:avLst/>
+          </a:prstGeom>
+          <a:noFill/>
+        </p:spPr>
+        <p:txBody>
+          <a:bodyPr wrap="square" rtlCol="0">
+            <a:spAutoFit/>
+          </a:bodyPr>
+          <a:lstStyle/>
+          <a:p>
+            <a:r>
+              <a:rPr lang="en-US" dirty="0" smtClean="0"/>
+              <a:t>Last Tile Placed by Player</a:t>
+            </a:r>
+            <a:endParaRPr lang="en-US" dirty="0"/>
+          </a:p>
+        </p:txBody>
+      </p:sp>
+    </p:spTree>
+    <p:extLst>
+      <p:ext uri="{BB962C8B-B14F-4D97-AF65-F5344CB8AC3E}">
+        <p14:creationId xmlns:p14="http://schemas.microsoft.com/office/powerpoint/2010/main" val="3755938227"/>
+      </p:ext>
+    </p:extLst>
+  </p:cSld>
+  <p:clrMapOvr>
+    <a:masterClrMapping/>
+  </p:clrMapOvr>
+</p:sld>
+</file>
+
+<file path=ppt/slides/slide11.xml><?xml version="1.0" encoding="utf-8"?>
+<p:sld xmlns:a="http://schemas.openxmlformats.org/drawingml/2006/main" xmlns:r="http://schemas.openxmlformats.org/officeDocument/2006/relationships" xmlns:p="http://schemas.openxmlformats.org/presentationml/2006/main">
+  <p:cSld>
+    <p:spTree>
+      <p:nvGrpSpPr>
+        <p:cNvPr id="1" name=""/>
+        <p:cNvGrpSpPr/>
+        <p:nvPr/>
+      </p:nvGrpSpPr>
+      <p:grpSpPr>
+        <a:xfrm>
+          <a:off x="0" y="0"/>
+          <a:ext cx="0" cy="0"/>
+          <a:chOff x="0" y="0"/>
+          <a:chExt cx="0" cy="0"/>
+        </a:xfrm>
+      </p:grpSpPr>
+      <p:sp>
+        <p:nvSpPr>
+          <p:cNvPr id="3" name="Content Placeholder 2"/>
+          <p:cNvSpPr>
+            <a:spLocks noGrp="1"/>
+          </p:cNvSpPr>
+          <p:nvPr>
+            <p:ph idx="1"/>
+          </p:nvPr>
+        </p:nvSpPr>
+        <p:spPr>
+          <a:xfrm>
+            <a:off x="538034" y="1216025"/>
+            <a:ext cx="7886700" cy="4351338"/>
+          </a:xfrm>
+        </p:spPr>
+        <p:txBody>
+          <a:bodyPr/>
+          <a:lstStyle/>
+          <a:p>
+            <a:pPr marL="514350" indent="-514350">
+              <a:buFont typeface="+mj-lt"/>
+              <a:buAutoNum type="arabicPeriod"/>
+            </a:pPr>
+            <a:endParaRPr lang="en-US" dirty="0"/>
+          </a:p>
+        </p:txBody>
+      </p:sp>
+      <p:sp>
+        <p:nvSpPr>
+          <p:cNvPr id="4" name="Rectangle 3"/>
+          <p:cNvSpPr/>
+          <p:nvPr/>
+        </p:nvSpPr>
+        <p:spPr>
+          <a:xfrm>
+            <a:off x="442957" y="-30838"/>
+            <a:ext cx="2521268" cy="923330"/>
+          </a:xfrm>
+          <a:prstGeom prst="rect">
+            <a:avLst/>
+          </a:prstGeom>
+          <a:noFill/>
+        </p:spPr>
+        <p:txBody>
+          <a:bodyPr wrap="none" lIns="91440" tIns="45720" rIns="91440" bIns="45720">
+            <a:spAutoFit/>
+          </a:bodyPr>
+          <a:lstStyle/>
+          <a:p>
+            <a:pPr algn="ctr"/>
+            <a:r>
+              <a:rPr lang="en-US" altLang="zh-CN" sz="5400" b="1" cap="none" spc="0" dirty="0" smtClean="0">
+                <a:ln w="9525">
+                  <a:solidFill>
+                    <a:schemeClr val="bg1"/>
+                  </a:solidFill>
+                  <a:prstDash val="solid"/>
+                </a:ln>
+                <a:solidFill>
+                  <a:schemeClr val="tx1"/>
+                </a:solidFill>
+                <a:effectLst>
+                  <a:outerShdw blurRad="12700" dist="38100" dir="2700000" algn="tl" rotWithShape="0">
+                    <a:schemeClr val="bg1">
+                      <a:lumMod val="50000"/>
+                    </a:schemeClr>
+                  </a:outerShdw>
+                </a:effectLst>
+              </a:rPr>
+              <a:t> </a:t>
+            </a:r>
+            <a:r>
+              <a:rPr lang="en-US" altLang="zh-CN" sz="4000" b="1" dirty="0" smtClean="0">
+                <a:ln w="9525">
+                  <a:solidFill>
+                    <a:schemeClr val="bg1"/>
+                  </a:solidFill>
+                  <a:prstDash val="solid"/>
+                </a:ln>
+                <a:effectLst>
+                  <a:outerShdw blurRad="12700" dist="38100" dir="2700000" algn="tl" rotWithShape="0">
+                    <a:schemeClr val="bg1">
+                      <a:lumMod val="50000"/>
+                    </a:schemeClr>
+                  </a:outerShdw>
+                </a:effectLst>
+              </a:rPr>
+              <a:t>Dead cave</a:t>
+            </a:r>
+            <a:endParaRPr lang="en-US" sz="4000" b="1" cap="none" spc="0" dirty="0">
+              <a:ln w="9525">
+                <a:solidFill>
+                  <a:schemeClr val="bg1"/>
+                </a:solidFill>
+                <a:prstDash val="solid"/>
+              </a:ln>
+              <a:solidFill>
+                <a:schemeClr val="tx1"/>
+              </a:solidFill>
+              <a:effectLst>
+                <a:outerShdw blurRad="12700" dist="38100" dir="2700000" algn="tl" rotWithShape="0">
+                  <a:schemeClr val="bg1">
+                    <a:lumMod val="50000"/>
+                  </a:schemeClr>
+                </a:outerShdw>
+              </a:effectLst>
+            </a:endParaRPr>
+          </a:p>
+        </p:txBody>
+      </p:sp>
+      <p:pic>
+        <p:nvPicPr>
+          <p:cNvPr id="5" name="Picture 4"/>
+          <p:cNvPicPr>
+            <a:picLocks noChangeAspect="1"/>
+          </p:cNvPicPr>
+          <p:nvPr/>
+        </p:nvPicPr>
+        <p:blipFill>
+          <a:blip r:embed="rId2"/>
+          <a:stretch>
+            <a:fillRect/>
+          </a:stretch>
+        </p:blipFill>
+        <p:spPr>
+          <a:xfrm>
+            <a:off x="634314" y="1803571"/>
+            <a:ext cx="1828800" cy="1866900"/>
+          </a:xfrm>
+          <a:prstGeom prst="rect">
+            <a:avLst/>
+          </a:prstGeom>
+        </p:spPr>
+      </p:pic>
+    </p:spTree>
+    <p:extLst>
+      <p:ext uri="{BB962C8B-B14F-4D97-AF65-F5344CB8AC3E}">
+        <p14:creationId xmlns:p14="http://schemas.microsoft.com/office/powerpoint/2010/main" val="937111027"/>
+      </p:ext>
+    </p:extLst>
+  </p:cSld>
+  <p:clrMapOvr>
+    <a:masterClrMapping/>
+  </p:clrMapOvr>
+</p:sld>
+</file>
+
+<file path=ppt/slides/slide12.xml><?xml version="1.0" encoding="utf-8"?>
+<p:sld xmlns:a="http://schemas.openxmlformats.org/drawingml/2006/main" xmlns:r="http://schemas.openxmlformats.org/officeDocument/2006/relationships" xmlns:p="http://schemas.openxmlformats.org/presentationml/2006/main">
+  <p:cSld>
+    <p:spTree>
+      <p:nvGrpSpPr>
+        <p:cNvPr id="1" name=""/>
+        <p:cNvGrpSpPr/>
+        <p:nvPr/>
+      </p:nvGrpSpPr>
+      <p:grpSpPr>
+        <a:xfrm>
+          <a:off x="0" y="0"/>
+          <a:ext cx="0" cy="0"/>
+          <a:chOff x="0" y="0"/>
+          <a:chExt cx="0" cy="0"/>
+        </a:xfrm>
+      </p:grpSpPr>
+      <p:sp>
+        <p:nvSpPr>
+          <p:cNvPr id="4" name="Rectangle 3"/>
+          <p:cNvSpPr/>
+          <p:nvPr/>
+        </p:nvSpPr>
+        <p:spPr>
+          <a:xfrm>
+            <a:off x="3410465" y="1721708"/>
+            <a:ext cx="1581665" cy="691978"/>
+          </a:xfrm>
+          <a:prstGeom prst="rect">
+            <a:avLst/>
+          </a:prstGeom>
+        </p:spPr>
+        <p:style>
+          <a:lnRef idx="2">
+            <a:schemeClr val="accent1">
+              <a:shade val="50000"/>
+            </a:schemeClr>
+          </a:lnRef>
+          <a:fillRef idx="1">
+            <a:schemeClr val="accent1"/>
+          </a:fillRef>
+          <a:effectRef idx="0">
+            <a:schemeClr val="accent1"/>
+          </a:effectRef>
+          <a:fontRef idx="minor">
+            <a:schemeClr val="lt1"/>
+          </a:fontRef>
+        </p:style>
+        <p:txBody>
+          <a:bodyPr rtlCol="0" anchor="ctr"/>
+          <a:lstStyle/>
+          <a:p>
+            <a:pPr algn="ctr"/>
+            <a:r>
+              <a:rPr lang="en-US" dirty="0" smtClean="0"/>
+              <a:t>Board Representor</a:t>
+            </a:r>
+            <a:endParaRPr lang="en-US" dirty="0"/>
+          </a:p>
+        </p:txBody>
+      </p:sp>
+      <p:sp>
+        <p:nvSpPr>
+          <p:cNvPr id="5" name="Rectangle 4"/>
+          <p:cNvSpPr/>
+          <p:nvPr/>
+        </p:nvSpPr>
+        <p:spPr>
+          <a:xfrm>
+            <a:off x="3410464" y="2846173"/>
+            <a:ext cx="1581665" cy="691978"/>
+          </a:xfrm>
+          <a:prstGeom prst="rect">
+            <a:avLst/>
+          </a:prstGeom>
+        </p:spPr>
+        <p:style>
+          <a:lnRef idx="2">
+            <a:schemeClr val="accent1">
+              <a:shade val="50000"/>
+            </a:schemeClr>
+          </a:lnRef>
+          <a:fillRef idx="1">
+            <a:schemeClr val="accent1"/>
+          </a:fillRef>
+          <a:effectRef idx="0">
+            <a:schemeClr val="accent1"/>
+          </a:effectRef>
+          <a:fontRef idx="minor">
+            <a:schemeClr val="lt1"/>
+          </a:fontRef>
+        </p:style>
+        <p:txBody>
+          <a:bodyPr rtlCol="0" anchor="ctr"/>
+          <a:lstStyle/>
+          <a:p>
+            <a:pPr algn="ctr"/>
+            <a:r>
+              <a:rPr lang="en-US" dirty="0" smtClean="0"/>
+              <a:t>Main Processor</a:t>
+            </a:r>
+            <a:endParaRPr lang="en-US" dirty="0"/>
+          </a:p>
+        </p:txBody>
+      </p:sp>
+      <p:sp>
+        <p:nvSpPr>
+          <p:cNvPr id="6" name="Rectangle 5"/>
+          <p:cNvSpPr/>
+          <p:nvPr/>
+        </p:nvSpPr>
+        <p:spPr>
+          <a:xfrm>
+            <a:off x="3410464" y="4077729"/>
+            <a:ext cx="1581665" cy="691978"/>
+          </a:xfrm>
+          <a:prstGeom prst="rect">
+            <a:avLst/>
+          </a:prstGeom>
+        </p:spPr>
+        <p:style>
+          <a:lnRef idx="2">
+            <a:schemeClr val="accent1">
+              <a:shade val="50000"/>
+            </a:schemeClr>
+          </a:lnRef>
+          <a:fillRef idx="1">
+            <a:schemeClr val="accent1"/>
+          </a:fillRef>
+          <a:effectRef idx="0">
+            <a:schemeClr val="accent1"/>
+          </a:effectRef>
+          <a:fontRef idx="minor">
+            <a:schemeClr val="lt1"/>
+          </a:fontRef>
+        </p:style>
+        <p:txBody>
+          <a:bodyPr rtlCol="0" anchor="ctr"/>
+          <a:lstStyle/>
+          <a:p>
+            <a:pPr algn="ctr"/>
+            <a:r>
+              <a:rPr lang="en-US" dirty="0" smtClean="0"/>
+              <a:t>Move Translator</a:t>
+            </a:r>
+            <a:endParaRPr lang="en-US" dirty="0"/>
+          </a:p>
+        </p:txBody>
+      </p:sp>
+      <p:sp>
+        <p:nvSpPr>
+          <p:cNvPr id="7" name="Rectangle 6"/>
+          <p:cNvSpPr/>
+          <p:nvPr/>
+        </p:nvSpPr>
+        <p:spPr>
+          <a:xfrm>
+            <a:off x="3410464" y="5309285"/>
+            <a:ext cx="1581665" cy="691978"/>
+          </a:xfrm>
+          <a:prstGeom prst="rect">
+            <a:avLst/>
+          </a:prstGeom>
+        </p:spPr>
+        <p:style>
+          <a:lnRef idx="2">
+            <a:schemeClr val="accent1">
+              <a:shade val="50000"/>
+            </a:schemeClr>
+          </a:lnRef>
+          <a:fillRef idx="1">
+            <a:schemeClr val="accent1"/>
+          </a:fillRef>
+          <a:effectRef idx="0">
+            <a:schemeClr val="accent1"/>
+          </a:effectRef>
+          <a:fontRef idx="minor">
+            <a:schemeClr val="lt1"/>
+          </a:fontRef>
+        </p:style>
+        <p:txBody>
+          <a:bodyPr rtlCol="0" anchor="ctr"/>
+          <a:lstStyle/>
+          <a:p>
+            <a:pPr algn="ctr"/>
+            <a:r>
+              <a:rPr lang="en-US" dirty="0" smtClean="0"/>
+              <a:t>Output</a:t>
+            </a:r>
+          </a:p>
+          <a:p>
+            <a:pPr algn="ctr"/>
+            <a:r>
+              <a:rPr lang="en-US" dirty="0" smtClean="0"/>
+              <a:t>Command</a:t>
+            </a:r>
+            <a:endParaRPr lang="en-US" dirty="0"/>
+          </a:p>
+        </p:txBody>
+      </p:sp>
+      <p:sp>
+        <p:nvSpPr>
+          <p:cNvPr id="8" name="Rectangle 7"/>
+          <p:cNvSpPr/>
+          <p:nvPr/>
+        </p:nvSpPr>
+        <p:spPr>
+          <a:xfrm>
+            <a:off x="3410464" y="467498"/>
+            <a:ext cx="1581665" cy="691978"/>
+          </a:xfrm>
+          <a:prstGeom prst="rect">
+            <a:avLst/>
+          </a:prstGeom>
+        </p:spPr>
+        <p:style>
+          <a:lnRef idx="2">
+            <a:schemeClr val="accent1">
+              <a:shade val="50000"/>
+            </a:schemeClr>
+          </a:lnRef>
+          <a:fillRef idx="1">
+            <a:schemeClr val="accent1"/>
+          </a:fillRef>
+          <a:effectRef idx="0">
+            <a:schemeClr val="accent1"/>
+          </a:effectRef>
+          <a:fontRef idx="minor">
+            <a:schemeClr val="lt1"/>
+          </a:fontRef>
+        </p:style>
+        <p:txBody>
+          <a:bodyPr rtlCol="0" anchor="ctr"/>
+          <a:lstStyle/>
+          <a:p>
+            <a:pPr algn="ctr"/>
+            <a:r>
+              <a:rPr lang="en-US" dirty="0" smtClean="0"/>
+              <a:t>Input</a:t>
+            </a:r>
+          </a:p>
+          <a:p>
+            <a:pPr algn="ctr"/>
+            <a:r>
+              <a:rPr lang="en-US" dirty="0" smtClean="0"/>
+              <a:t>Command</a:t>
+            </a:r>
+            <a:endParaRPr lang="en-US" dirty="0"/>
+          </a:p>
+        </p:txBody>
+      </p:sp>
+      <p:sp>
+        <p:nvSpPr>
+          <p:cNvPr id="9" name="Rectangle 8"/>
+          <p:cNvSpPr/>
+          <p:nvPr/>
+        </p:nvSpPr>
+        <p:spPr>
+          <a:xfrm>
+            <a:off x="6100118" y="2846173"/>
+            <a:ext cx="1581665" cy="691978"/>
+          </a:xfrm>
+          <a:prstGeom prst="rect">
+            <a:avLst/>
+          </a:prstGeom>
+        </p:spPr>
+        <p:style>
+          <a:lnRef idx="2">
+            <a:schemeClr val="accent1">
+              <a:shade val="50000"/>
+            </a:schemeClr>
+          </a:lnRef>
+          <a:fillRef idx="1">
+            <a:schemeClr val="accent1"/>
+          </a:fillRef>
+          <a:effectRef idx="0">
+            <a:schemeClr val="accent1"/>
+          </a:effectRef>
+          <a:fontRef idx="minor">
+            <a:schemeClr val="lt1"/>
+          </a:fontRef>
+        </p:style>
+        <p:txBody>
+          <a:bodyPr rtlCol="0" anchor="ctr"/>
+          <a:lstStyle/>
+          <a:p>
+            <a:pPr algn="ctr"/>
+            <a:r>
+              <a:rPr lang="en-US" dirty="0" smtClean="0"/>
+              <a:t>RAM</a:t>
+            </a:r>
+            <a:endParaRPr lang="en-US" dirty="0"/>
+          </a:p>
+        </p:txBody>
+      </p:sp>
+      <p:cxnSp>
+        <p:nvCxnSpPr>
+          <p:cNvPr id="11" name="Straight Arrow Connector 10"/>
+          <p:cNvCxnSpPr>
+            <a:stCxn id="8" idx="2"/>
+            <a:endCxn id="4" idx="0"/>
+          </p:cNvCxnSpPr>
+          <p:nvPr/>
+        </p:nvCxnSpPr>
+        <p:spPr>
+          <a:xfrm>
+            <a:off x="4201297" y="1159476"/>
+            <a:ext cx="1" cy="562232"/>
+          </a:xfrm>
+          <a:prstGeom prst="straightConnector1">
+            <a:avLst/>
+          </a:prstGeom>
+          <a:ln>
+            <a:tailEnd type="triangle"/>
+          </a:ln>
+        </p:spPr>
+        <p:style>
+          <a:lnRef idx="1">
+            <a:schemeClr val="accent1"/>
+          </a:lnRef>
+          <a:fillRef idx="0">
+            <a:schemeClr val="accent1"/>
+          </a:fillRef>
+          <a:effectRef idx="0">
+            <a:schemeClr val="accent1"/>
+          </a:effectRef>
+          <a:fontRef idx="minor">
+            <a:schemeClr val="tx1"/>
+          </a:fontRef>
+        </p:style>
+      </p:cxnSp>
+      <p:cxnSp>
+        <p:nvCxnSpPr>
+          <p:cNvPr id="15" name="Straight Arrow Connector 14"/>
+          <p:cNvCxnSpPr>
+            <a:stCxn id="5" idx="2"/>
+            <a:endCxn id="6" idx="0"/>
+          </p:cNvCxnSpPr>
+          <p:nvPr/>
+        </p:nvCxnSpPr>
+        <p:spPr>
+          <a:xfrm>
+            <a:off x="4201297" y="3538151"/>
+            <a:ext cx="0" cy="539578"/>
+          </a:xfrm>
+          <a:prstGeom prst="straightConnector1">
+            <a:avLst/>
+          </a:prstGeom>
+          <a:ln>
+            <a:tailEnd type="triangle"/>
+          </a:ln>
+        </p:spPr>
+        <p:style>
+          <a:lnRef idx="1">
+            <a:schemeClr val="accent1"/>
+          </a:lnRef>
+          <a:fillRef idx="0">
+            <a:schemeClr val="accent1"/>
+          </a:fillRef>
+          <a:effectRef idx="0">
+            <a:schemeClr val="accent1"/>
+          </a:effectRef>
+          <a:fontRef idx="minor">
+            <a:schemeClr val="tx1"/>
+          </a:fontRef>
+        </p:style>
+      </p:cxnSp>
+      <p:cxnSp>
+        <p:nvCxnSpPr>
+          <p:cNvPr id="17" name="Straight Arrow Connector 16"/>
+          <p:cNvCxnSpPr>
+            <a:stCxn id="6" idx="2"/>
+            <a:endCxn id="7" idx="0"/>
+          </p:cNvCxnSpPr>
+          <p:nvPr/>
+        </p:nvCxnSpPr>
+        <p:spPr>
+          <a:xfrm>
+            <a:off x="4201297" y="4769707"/>
+            <a:ext cx="0" cy="539578"/>
+          </a:xfrm>
+          <a:prstGeom prst="straightConnector1">
+            <a:avLst/>
+          </a:prstGeom>
+          <a:ln>
+            <a:tailEnd type="triangle"/>
+          </a:ln>
+        </p:spPr>
+        <p:style>
+          <a:lnRef idx="1">
+            <a:schemeClr val="accent1"/>
+          </a:lnRef>
+          <a:fillRef idx="0">
+            <a:schemeClr val="accent1"/>
+          </a:fillRef>
+          <a:effectRef idx="0">
+            <a:schemeClr val="accent1"/>
+          </a:effectRef>
+          <a:fontRef idx="minor">
+            <a:schemeClr val="tx1"/>
+          </a:fontRef>
+        </p:style>
+      </p:cxnSp>
+      <p:cxnSp>
+        <p:nvCxnSpPr>
+          <p:cNvPr id="19" name="Straight Arrow Connector 18"/>
+          <p:cNvCxnSpPr>
+            <a:stCxn id="9" idx="1"/>
+            <a:endCxn id="5" idx="3"/>
+          </p:cNvCxnSpPr>
+          <p:nvPr/>
+        </p:nvCxnSpPr>
+        <p:spPr>
+          <a:xfrm flipH="1">
+            <a:off x="4992129" y="3192162"/>
+            <a:ext cx="1107989" cy="0"/>
+          </a:xfrm>
+          <a:prstGeom prst="straightConnector1">
+            <a:avLst/>
+          </a:prstGeom>
+          <a:ln>
+            <a:tailEnd type="triangle"/>
+          </a:ln>
+        </p:spPr>
+        <p:style>
+          <a:lnRef idx="1">
+            <a:schemeClr val="accent1"/>
+          </a:lnRef>
+          <a:fillRef idx="0">
+            <a:schemeClr val="accent1"/>
+          </a:fillRef>
+          <a:effectRef idx="0">
+            <a:schemeClr val="accent1"/>
+          </a:effectRef>
+          <a:fontRef idx="minor">
+            <a:schemeClr val="tx1"/>
+          </a:fontRef>
+        </p:style>
+      </p:cxnSp>
+      <p:cxnSp>
+        <p:nvCxnSpPr>
+          <p:cNvPr id="21" name="Straight Arrow Connector 20"/>
+          <p:cNvCxnSpPr>
+            <a:stCxn id="4" idx="2"/>
+            <a:endCxn id="5" idx="0"/>
+          </p:cNvCxnSpPr>
+          <p:nvPr/>
+        </p:nvCxnSpPr>
+        <p:spPr>
+          <a:xfrm flipH="1">
+            <a:off x="4201297" y="2413686"/>
+            <a:ext cx="1" cy="432487"/>
+          </a:xfrm>
+          <a:prstGeom prst="straightConnector1">
+            <a:avLst/>
+          </a:prstGeom>
+          <a:ln>
+            <a:tailEnd type="triangle"/>
+          </a:ln>
+        </p:spPr>
+        <p:style>
+          <a:lnRef idx="1">
+            <a:schemeClr val="accent1"/>
+          </a:lnRef>
+          <a:fillRef idx="0">
+            <a:schemeClr val="accent1"/>
+          </a:fillRef>
+          <a:effectRef idx="0">
+            <a:schemeClr val="accent1"/>
+          </a:effectRef>
+          <a:fontRef idx="minor">
+            <a:schemeClr val="tx1"/>
+          </a:fontRef>
+        </p:style>
+      </p:cxnSp>
+    </p:spTree>
+    <p:extLst>
+      <p:ext uri="{BB962C8B-B14F-4D97-AF65-F5344CB8AC3E}">
+        <p14:creationId xmlns:p14="http://schemas.microsoft.com/office/powerpoint/2010/main" val="3134242800"/>
       </p:ext>
     </p:extLst>
   </p:cSld>
@@ -14293,11 +15241,7 @@
             </a:r>
             <a:r>
               <a:rPr lang="en-US" sz="1400" dirty="0" smtClean="0"/>
-              <a:t>)(optional) </a:t>
-            </a:r>
-            <a:r>
-              <a:rPr lang="en-US" sz="1400" dirty="0" smtClean="0"/>
-              <a:t>+ Path ID</a:t>
+              <a:t>)(optional) + Path ID</a:t>
             </a:r>
           </a:p>
           <a:p>
@@ -14306,30 +15250,13 @@
           <a:p>
             <a:r>
               <a:rPr lang="en-US" i="1" dirty="0" smtClean="0"/>
-              <a:t>Memory array</a:t>
+              <a:t>Memory array: contour</a:t>
             </a:r>
-            <a:r>
-              <a:rPr lang="en-US" i="1" dirty="0" smtClean="0"/>
-              <a:t>: contour</a:t>
-            </a:r>
-            <a:endParaRPr lang="en-US" i="1" dirty="0" smtClean="0"/>
           </a:p>
           <a:p>
             <a:r>
               <a:rPr lang="en-US" sz="1600" dirty="0" smtClean="0"/>
-              <a:t>Edges are stored counter clock-wisely. The first </a:t>
-            </a:r>
-            <a:r>
-              <a:rPr lang="en-US" sz="1600" dirty="0" smtClean="0"/>
-              <a:t>element of contour </a:t>
-            </a:r>
-            <a:r>
-              <a:rPr lang="en-US" sz="1600" dirty="0" smtClean="0"/>
-              <a:t>is called pointer</a:t>
-            </a:r>
-            <a:r>
-              <a:rPr lang="en-US" sz="1600" dirty="0" smtClean="0"/>
-              <a:t>.</a:t>
+              <a:t>Edges are stored counter clock-wisely. The first element of contour is called pointer.</a:t>
             </a:r>
             <a:endParaRPr lang="en-US" sz="1600" dirty="0"/>
           </a:p>
@@ -14359,6 +15286,442 @@
 </file>
 
 <file path=ppt/slides/slide6.xml><?xml version="1.0" encoding="utf-8"?>
+<p:sld xmlns:a="http://schemas.openxmlformats.org/drawingml/2006/main" xmlns:r="http://schemas.openxmlformats.org/officeDocument/2006/relationships" xmlns:p="http://schemas.openxmlformats.org/presentationml/2006/main">
+  <p:cSld>
+    <p:spTree>
+      <p:nvGrpSpPr>
+        <p:cNvPr id="1" name=""/>
+        <p:cNvGrpSpPr/>
+        <p:nvPr/>
+      </p:nvGrpSpPr>
+      <p:grpSpPr>
+        <a:xfrm>
+          <a:off x="0" y="0"/>
+          <a:ext cx="0" cy="0"/>
+          <a:chOff x="0" y="0"/>
+          <a:chExt cx="0" cy="0"/>
+        </a:xfrm>
+      </p:grpSpPr>
+      <p:sp>
+        <p:nvSpPr>
+          <p:cNvPr id="12" name="Rectangle 11"/>
+          <p:cNvSpPr/>
+          <p:nvPr/>
+        </p:nvSpPr>
+        <p:spPr>
+          <a:xfrm>
+            <a:off x="243840" y="-30838"/>
+            <a:ext cx="6461769" cy="923330"/>
+          </a:xfrm>
+          <a:prstGeom prst="rect">
+            <a:avLst/>
+          </a:prstGeom>
+          <a:noFill/>
+        </p:spPr>
+        <p:txBody>
+          <a:bodyPr wrap="none" lIns="91440" tIns="45720" rIns="91440" bIns="45720">
+            <a:spAutoFit/>
+          </a:bodyPr>
+          <a:lstStyle/>
+          <a:p>
+            <a:pPr algn="ctr"/>
+            <a:r>
+              <a:rPr lang="en-US" altLang="zh-CN" sz="5400" b="1" cap="none" spc="0" dirty="0" smtClean="0">
+                <a:ln w="9525">
+                  <a:solidFill>
+                    <a:schemeClr val="bg1"/>
+                  </a:solidFill>
+                  <a:prstDash val="solid"/>
+                </a:ln>
+                <a:solidFill>
+                  <a:schemeClr val="tx1"/>
+                </a:solidFill>
+                <a:effectLst>
+                  <a:outerShdw blurRad="12700" dist="38100" dir="2700000" algn="tl" rotWithShape="0">
+                    <a:schemeClr val="bg1">
+                      <a:lumMod val="50000"/>
+                    </a:schemeClr>
+                  </a:outerShdw>
+                </a:effectLst>
+              </a:rPr>
+              <a:t> </a:t>
+            </a:r>
+            <a:r>
+              <a:rPr lang="en-US" altLang="zh-CN" sz="4000" b="1" cap="none" spc="0" dirty="0" smtClean="0">
+                <a:ln w="9525">
+                  <a:solidFill>
+                    <a:schemeClr val="bg1"/>
+                  </a:solidFill>
+                  <a:prstDash val="solid"/>
+                </a:ln>
+                <a:solidFill>
+                  <a:schemeClr val="tx1"/>
+                </a:solidFill>
+                <a:effectLst>
+                  <a:outerShdw blurRad="12700" dist="38100" dir="2700000" algn="tl" rotWithShape="0">
+                    <a:schemeClr val="bg1">
+                      <a:lumMod val="50000"/>
+                    </a:schemeClr>
+                  </a:outerShdw>
+                </a:effectLst>
+              </a:rPr>
+              <a:t>Chessboard representation 2</a:t>
+            </a:r>
+            <a:endParaRPr lang="en-US" sz="4000" b="1" cap="none" spc="0" dirty="0">
+              <a:ln w="9525">
+                <a:solidFill>
+                  <a:schemeClr val="bg1"/>
+                </a:solidFill>
+                <a:prstDash val="solid"/>
+              </a:ln>
+              <a:solidFill>
+                <a:schemeClr val="tx1"/>
+              </a:solidFill>
+              <a:effectLst>
+                <a:outerShdw blurRad="12700" dist="38100" dir="2700000" algn="tl" rotWithShape="0">
+                  <a:schemeClr val="bg1">
+                    <a:lumMod val="50000"/>
+                  </a:schemeClr>
+                </a:outerShdw>
+              </a:effectLst>
+            </a:endParaRPr>
+          </a:p>
+        </p:txBody>
+      </p:sp>
+      <p:sp>
+        <p:nvSpPr>
+          <p:cNvPr id="14" name="TextBox 13"/>
+          <p:cNvSpPr txBox="1"/>
+          <p:nvPr/>
+        </p:nvSpPr>
+        <p:spPr>
+          <a:xfrm>
+            <a:off x="510580" y="1338620"/>
+            <a:ext cx="8522461" cy="4985980"/>
+          </a:xfrm>
+          <a:prstGeom prst="rect">
+            <a:avLst/>
+          </a:prstGeom>
+          <a:noFill/>
+        </p:spPr>
+        <p:txBody>
+          <a:bodyPr wrap="none" rtlCol="0">
+            <a:spAutoFit/>
+          </a:bodyPr>
+          <a:lstStyle/>
+          <a:p>
+            <a:r>
+              <a:rPr lang="en-US" altLang="zh-CN" i="1" dirty="0" smtClean="0"/>
+              <a:t>Multi-contour Situation</a:t>
+            </a:r>
+            <a:endParaRPr lang="en-US" sz="1400" dirty="0" smtClean="0"/>
+          </a:p>
+          <a:p>
+            <a:endParaRPr lang="en-US" sz="1200" dirty="0" smtClean="0"/>
+          </a:p>
+          <a:p>
+            <a:endParaRPr lang="en-US" sz="1600" dirty="0" smtClean="0"/>
+          </a:p>
+          <a:p>
+            <a:endParaRPr lang="en-US" sz="1600" dirty="0"/>
+          </a:p>
+          <a:p>
+            <a:endParaRPr lang="en-US" sz="1600" dirty="0" smtClean="0"/>
+          </a:p>
+          <a:p>
+            <a:endParaRPr lang="en-US" sz="1600" dirty="0"/>
+          </a:p>
+          <a:p>
+            <a:endParaRPr lang="en-US" sz="1600" dirty="0" smtClean="0"/>
+          </a:p>
+          <a:p>
+            <a:endParaRPr lang="en-US" sz="1600" dirty="0"/>
+          </a:p>
+          <a:p>
+            <a:endParaRPr lang="en-US" sz="1600" dirty="0" smtClean="0"/>
+          </a:p>
+          <a:p>
+            <a:endParaRPr lang="en-US" sz="1600" dirty="0"/>
+          </a:p>
+          <a:p>
+            <a:endParaRPr lang="en-US" sz="1600" dirty="0" smtClean="0"/>
+          </a:p>
+          <a:p>
+            <a:endParaRPr lang="en-US" sz="1600" dirty="0"/>
+          </a:p>
+          <a:p>
+            <a:r>
+              <a:rPr lang="en-US" sz="1600" dirty="0" smtClean="0"/>
+              <a:t>Situation 1: </a:t>
+            </a:r>
+            <a:r>
+              <a:rPr lang="en-US" sz="1600" dirty="0"/>
+              <a:t>When </a:t>
+            </a:r>
+            <a:r>
+              <a:rPr lang="en-US" sz="1600" dirty="0" smtClean="0"/>
+              <a:t>(the </a:t>
+            </a:r>
+            <a:r>
+              <a:rPr lang="en-US" sz="1600" dirty="0"/>
+              <a:t>new tile’s surrounding tile existence is </a:t>
+            </a:r>
+            <a:r>
+              <a:rPr lang="en-US" sz="1600" dirty="0" smtClean="0"/>
+              <a:t>0001,0010,0100 or 1000) and (the</a:t>
+            </a:r>
+          </a:p>
+          <a:p>
+            <a:r>
+              <a:rPr lang="en-US" sz="1600" dirty="0" smtClean="0"/>
+              <a:t> tile existence of the corner at the other side of the existing tile is 1) ,</a:t>
+            </a:r>
+            <a:r>
+              <a:rPr lang="en-US" sz="1600" dirty="0"/>
+              <a:t> a new contour appears</a:t>
+            </a:r>
+            <a:r>
+              <a:rPr lang="en-US" sz="1600" dirty="0" smtClean="0"/>
+              <a:t>.</a:t>
+            </a:r>
+            <a:endParaRPr lang="en-US" sz="1600" dirty="0" smtClean="0"/>
+          </a:p>
+          <a:p>
+            <a:r>
+              <a:rPr lang="en-US" sz="1600" dirty="0" smtClean="0"/>
+              <a:t>Situation 2: When the new tile’s surrounding tile existence is 0101 or 1010, a new contour appears.</a:t>
+            </a:r>
+          </a:p>
+          <a:p>
+            <a:endParaRPr lang="en-US" sz="1600" dirty="0"/>
+          </a:p>
+          <a:p>
+            <a:r>
+              <a:rPr lang="en-US" sz="1600" dirty="0" smtClean="0"/>
+              <a:t>Contours are </a:t>
+            </a:r>
+            <a:r>
+              <a:rPr lang="en-US" sz="1600" dirty="0" smtClean="0"/>
+              <a:t>stored </a:t>
+            </a:r>
+            <a:r>
+              <a:rPr lang="en-US" sz="1600" dirty="0" smtClean="0"/>
+              <a:t>according to the order of their occurrence. </a:t>
+            </a:r>
+            <a:r>
+              <a:rPr lang="en-US" sz="1600" dirty="0" smtClean="0"/>
+              <a:t>The first element of contour is </a:t>
+            </a:r>
+            <a:r>
+              <a:rPr lang="en-US" sz="1600" dirty="0" smtClean="0"/>
+              <a:t>called</a:t>
+            </a:r>
+          </a:p>
+          <a:p>
+            <a:r>
+              <a:rPr lang="en-US" sz="1600" dirty="0" smtClean="0"/>
+              <a:t> </a:t>
+            </a:r>
+            <a:r>
+              <a:rPr lang="en-US" sz="1600" dirty="0" smtClean="0"/>
+              <a:t>pointer.</a:t>
+            </a:r>
+            <a:endParaRPr lang="en-US" sz="1600" dirty="0"/>
+          </a:p>
+          <a:p>
+            <a:endParaRPr lang="en-US" sz="1600" dirty="0" smtClean="0"/>
+          </a:p>
+          <a:p>
+            <a:r>
+              <a:rPr lang="en-US" sz="1600" dirty="0" smtClean="0"/>
+              <a:t> </a:t>
+            </a:r>
+            <a:endParaRPr lang="en-US" sz="1600" dirty="0"/>
+          </a:p>
+        </p:txBody>
+      </p:sp>
+      <p:pic>
+        <p:nvPicPr>
+          <p:cNvPr id="3" name="Picture 2"/>
+          <p:cNvPicPr>
+            <a:picLocks noChangeAspect="1"/>
+          </p:cNvPicPr>
+          <p:nvPr/>
+        </p:nvPicPr>
+        <p:blipFill>
+          <a:blip r:embed="rId2"/>
+          <a:stretch>
+            <a:fillRect/>
+          </a:stretch>
+        </p:blipFill>
+        <p:spPr>
+          <a:xfrm>
+            <a:off x="3811929" y="1844116"/>
+            <a:ext cx="1800225" cy="2228850"/>
+          </a:xfrm>
+          <a:prstGeom prst="rect">
+            <a:avLst/>
+          </a:prstGeom>
+        </p:spPr>
+      </p:pic>
+      <p:pic>
+        <p:nvPicPr>
+          <p:cNvPr id="8" name="Picture 7"/>
+          <p:cNvPicPr>
+            <a:picLocks noChangeAspect="1"/>
+          </p:cNvPicPr>
+          <p:nvPr/>
+        </p:nvPicPr>
+        <p:blipFill>
+          <a:blip r:embed="rId3"/>
+          <a:stretch>
+            <a:fillRect/>
+          </a:stretch>
+        </p:blipFill>
+        <p:spPr>
+          <a:xfrm>
+            <a:off x="634221" y="1905914"/>
+            <a:ext cx="1800225" cy="1790700"/>
+          </a:xfrm>
+          <a:prstGeom prst="rect">
+            <a:avLst/>
+          </a:prstGeom>
+        </p:spPr>
+      </p:pic>
+      <p:cxnSp>
+        <p:nvCxnSpPr>
+          <p:cNvPr id="5" name="Straight Arrow Connector 4"/>
+          <p:cNvCxnSpPr/>
+          <p:nvPr/>
+        </p:nvCxnSpPr>
+        <p:spPr>
+          <a:xfrm>
+            <a:off x="1713763" y="2123364"/>
+            <a:ext cx="1037675" cy="109090"/>
+          </a:xfrm>
+          <a:prstGeom prst="straightConnector1">
+            <a:avLst/>
+          </a:prstGeom>
+          <a:ln w="38100">
+            <a:tailEnd type="triangle"/>
+          </a:ln>
+        </p:spPr>
+        <p:style>
+          <a:lnRef idx="1">
+            <a:schemeClr val="accent2"/>
+          </a:lnRef>
+          <a:fillRef idx="0">
+            <a:schemeClr val="accent2"/>
+          </a:fillRef>
+          <a:effectRef idx="0">
+            <a:schemeClr val="accent2"/>
+          </a:effectRef>
+          <a:fontRef idx="minor">
+            <a:schemeClr val="tx1"/>
+          </a:fontRef>
+        </p:style>
+      </p:cxnSp>
+      <p:cxnSp>
+        <p:nvCxnSpPr>
+          <p:cNvPr id="9" name="Straight Arrow Connector 8"/>
+          <p:cNvCxnSpPr/>
+          <p:nvPr/>
+        </p:nvCxnSpPr>
+        <p:spPr>
+          <a:xfrm flipH="1">
+            <a:off x="3508416" y="2148743"/>
+            <a:ext cx="1364264" cy="119449"/>
+          </a:xfrm>
+          <a:prstGeom prst="straightConnector1">
+            <a:avLst/>
+          </a:prstGeom>
+          <a:ln w="38100">
+            <a:tailEnd type="triangle"/>
+          </a:ln>
+        </p:spPr>
+        <p:style>
+          <a:lnRef idx="1">
+            <a:schemeClr val="accent2"/>
+          </a:lnRef>
+          <a:fillRef idx="0">
+            <a:schemeClr val="accent2"/>
+          </a:fillRef>
+          <a:effectRef idx="0">
+            <a:schemeClr val="accent2"/>
+          </a:effectRef>
+          <a:fontRef idx="minor">
+            <a:schemeClr val="tx1"/>
+          </a:fontRef>
+        </p:style>
+      </p:cxnSp>
+      <p:sp>
+        <p:nvSpPr>
+          <p:cNvPr id="7" name="TextBox 6"/>
+          <p:cNvSpPr txBox="1"/>
+          <p:nvPr/>
+        </p:nvSpPr>
+        <p:spPr>
+          <a:xfrm>
+            <a:off x="2682879" y="2181695"/>
+            <a:ext cx="943528" cy="369332"/>
+          </a:xfrm>
+          <a:prstGeom prst="rect">
+            <a:avLst/>
+          </a:prstGeom>
+          <a:noFill/>
+        </p:spPr>
+        <p:txBody>
+          <a:bodyPr wrap="none" rtlCol="0">
+            <a:spAutoFit/>
+          </a:bodyPr>
+          <a:lstStyle/>
+          <a:p>
+            <a:r>
+              <a:rPr lang="en-US" dirty="0" smtClean="0"/>
+              <a:t>Last Tile</a:t>
+            </a:r>
+            <a:endParaRPr lang="en-US" dirty="0"/>
+          </a:p>
+        </p:txBody>
+      </p:sp>
+      <p:pic>
+        <p:nvPicPr>
+          <p:cNvPr id="15" name="Picture 14"/>
+          <p:cNvPicPr>
+            <a:picLocks noChangeAspect="1"/>
+          </p:cNvPicPr>
+          <p:nvPr/>
+        </p:nvPicPr>
+        <p:blipFill>
+          <a:blip r:embed="rId4"/>
+          <a:stretch>
+            <a:fillRect/>
+          </a:stretch>
+        </p:blipFill>
+        <p:spPr>
+          <a:xfrm>
+            <a:off x="6854948" y="1859630"/>
+            <a:ext cx="1781175" cy="2200275"/>
+          </a:xfrm>
+          <a:prstGeom prst="rect">
+            <a:avLst/>
+          </a:prstGeom>
+        </p:spPr>
+      </p:pic>
+    </p:spTree>
+    <p:extLst>
+      <p:ext uri="{BB962C8B-B14F-4D97-AF65-F5344CB8AC3E}">
+        <p14:creationId xmlns:p14="http://schemas.microsoft.com/office/powerpoint/2010/main" val="3961615291"/>
+      </p:ext>
+    </p:extLst>
+  </p:cSld>
+  <p:clrMapOvr>
+    <a:masterClrMapping/>
+  </p:clrMapOvr>
+</p:sld>
+</file>
+
+<file path=ppt/slides/slide7.xml><?xml version="1.0" encoding="utf-8"?>
 <p:sld xmlns:a="http://schemas.openxmlformats.org/drawingml/2006/main" xmlns:r="http://schemas.openxmlformats.org/officeDocument/2006/relationships" xmlns:p="http://schemas.openxmlformats.org/presentationml/2006/main">
   <p:cSld>
     <p:spTree>
@@ -15113,7 +16476,7 @@
 </p:sld>
 </file>
 
-<file path=ppt/slides/slide7.xml><?xml version="1.0" encoding="utf-8"?>
+<file path=ppt/slides/slide8.xml><?xml version="1.0" encoding="utf-8"?>
 <p:sld xmlns:a="http://schemas.openxmlformats.org/drawingml/2006/main" xmlns:r="http://schemas.openxmlformats.org/officeDocument/2006/relationships" xmlns:p="http://schemas.openxmlformats.org/presentationml/2006/main">
   <p:cSld>
     <p:spTree>
@@ -15608,7 +16971,7 @@
 </p:sld>
 </file>
 
-<file path=ppt/slides/slide8.xml><?xml version="1.0" encoding="utf-8"?>
+<file path=ppt/slides/slide9.xml><?xml version="1.0" encoding="utf-8"?>
 <p:sld xmlns:a="http://schemas.openxmlformats.org/drawingml/2006/main" xmlns:r="http://schemas.openxmlformats.org/officeDocument/2006/relationships" xmlns:p="http://schemas.openxmlformats.org/presentationml/2006/main">
   <p:cSld>
     <p:spTree>
@@ -15764,7 +17127,7 @@
           <p:nvPr>
             <p:extLst>
               <p:ext uri="{D42A27DB-BD31-4B8C-83A1-F6EECF244321}">
-                <p14:modId xmlns:p14="http://schemas.microsoft.com/office/powerpoint/2010/main" val="2044195880"/>
+                <p14:modId xmlns:p14="http://schemas.microsoft.com/office/powerpoint/2010/main" val="3388498973"/>
               </p:ext>
             </p:extLst>
           </p:nvPr>
@@ -16188,14 +17551,16 @@
                     <a:p>
                       <a:r>
                         <a:rPr lang="en-US" dirty="0" smtClean="0"/>
-                        <a:t>X</a:t>
-                      </a:r>
+                        <a:t>X-1</a:t>
+                      </a:r>
+                      <a:endParaRPr lang="en-US" dirty="0" smtClean="0"/>
                     </a:p>
                     <a:p>
                       <a:r>
                         <a:rPr lang="en-US" dirty="0" smtClean="0"/>
-                        <a:t>Y-1</a:t>
-                      </a:r>
+                        <a:t>Y</a:t>
+                      </a:r>
+                      <a:endParaRPr lang="en-US" dirty="0" smtClean="0"/>
                     </a:p>
                   </a:txBody>
                   <a:tcPr anchor="ctr" anchorCtr="1"/>
@@ -16261,7 +17626,7 @@
         </p:nvGrpSpPr>
         <p:grpSpPr>
           <a:xfrm>
-            <a:off x="6579654" y="498901"/>
+            <a:off x="7262406" y="498901"/>
             <a:ext cx="1762898" cy="1833426"/>
             <a:chOff x="613978" y="2078953"/>
             <a:chExt cx="1762898" cy="1833426"/>
@@ -18350,498 +19715,198 @@
           </p:style>
         </p:cxnSp>
       </p:grpSp>
+      <p:grpSp>
+        <p:nvGrpSpPr>
+          <p:cNvPr id="52" name="Group 51"/>
+          <p:cNvGrpSpPr/>
+          <p:nvPr/>
+        </p:nvGrpSpPr>
+        <p:grpSpPr>
+          <a:xfrm>
+            <a:off x="5242958" y="533495"/>
+            <a:ext cx="1762898" cy="1809848"/>
+            <a:chOff x="5242958" y="533495"/>
+            <a:chExt cx="1762898" cy="1809848"/>
+          </a:xfrm>
+        </p:grpSpPr>
+        <p:sp>
+          <p:nvSpPr>
+            <p:cNvPr id="58" name="Rectangle 57"/>
+            <p:cNvSpPr/>
+            <p:nvPr/>
+          </p:nvSpPr>
+          <p:spPr>
+            <a:xfrm>
+              <a:off x="5242958" y="533495"/>
+              <a:ext cx="1762898" cy="1809848"/>
+            </a:xfrm>
+            <a:prstGeom prst="rect">
+              <a:avLst/>
+            </a:prstGeom>
+            <a:noFill/>
+          </p:spPr>
+          <p:style>
+            <a:lnRef idx="2">
+              <a:schemeClr val="accent1">
+                <a:shade val="50000"/>
+              </a:schemeClr>
+            </a:lnRef>
+            <a:fillRef idx="1">
+              <a:schemeClr val="accent1"/>
+            </a:fillRef>
+            <a:effectRef idx="0">
+              <a:schemeClr val="accent1"/>
+            </a:effectRef>
+            <a:fontRef idx="minor">
+              <a:schemeClr val="lt1"/>
+            </a:fontRef>
+          </p:style>
+          <p:txBody>
+            <a:bodyPr rtlCol="0" anchor="ctr"/>
+            <a:lstStyle/>
+            <a:p>
+              <a:pPr algn="ctr"/>
+              <a:endParaRPr lang="en-US"/>
+            </a:p>
+          </p:txBody>
+        </p:sp>
+        <p:cxnSp>
+          <p:nvCxnSpPr>
+            <p:cNvPr id="22" name="Straight Arrow Connector 21"/>
+            <p:cNvCxnSpPr/>
+            <p:nvPr/>
+          </p:nvCxnSpPr>
+          <p:spPr>
+            <a:xfrm>
+              <a:off x="5699337" y="1015012"/>
+              <a:ext cx="911731" cy="0"/>
+            </a:xfrm>
+            <a:prstGeom prst="straightConnector1">
+              <a:avLst/>
+            </a:prstGeom>
+            <a:ln w="38100">
+              <a:solidFill>
+                <a:schemeClr val="tx1"/>
+              </a:solidFill>
+              <a:tailEnd type="triangle"/>
+            </a:ln>
+          </p:spPr>
+          <p:style>
+            <a:lnRef idx="1">
+              <a:schemeClr val="accent1"/>
+            </a:lnRef>
+            <a:fillRef idx="0">
+              <a:schemeClr val="accent1"/>
+            </a:fillRef>
+            <a:effectRef idx="0">
+              <a:schemeClr val="accent1"/>
+            </a:effectRef>
+            <a:fontRef idx="minor">
+              <a:schemeClr val="tx1"/>
+            </a:fontRef>
+          </p:style>
+        </p:cxnSp>
+        <p:cxnSp>
+          <p:nvCxnSpPr>
+            <p:cNvPr id="64" name="Straight Arrow Connector 63"/>
+            <p:cNvCxnSpPr/>
+            <p:nvPr/>
+          </p:nvCxnSpPr>
+          <p:spPr>
+            <a:xfrm>
+              <a:off x="5699337" y="1015012"/>
+              <a:ext cx="0" cy="817661"/>
+            </a:xfrm>
+            <a:prstGeom prst="straightConnector1">
+              <a:avLst/>
+            </a:prstGeom>
+            <a:ln w="38100">
+              <a:solidFill>
+                <a:schemeClr val="tx1"/>
+              </a:solidFill>
+              <a:tailEnd type="triangle"/>
+            </a:ln>
+          </p:spPr>
+          <p:style>
+            <a:lnRef idx="1">
+              <a:schemeClr val="accent1"/>
+            </a:lnRef>
+            <a:fillRef idx="0">
+              <a:schemeClr val="accent1"/>
+            </a:fillRef>
+            <a:effectRef idx="0">
+              <a:schemeClr val="accent1"/>
+            </a:effectRef>
+            <a:fontRef idx="minor">
+              <a:schemeClr val="tx1"/>
+            </a:fontRef>
+          </p:style>
+        </p:cxnSp>
+        <p:sp>
+          <p:nvSpPr>
+            <p:cNvPr id="51" name="TextBox 50"/>
+            <p:cNvSpPr txBox="1"/>
+            <p:nvPr/>
+          </p:nvSpPr>
+          <p:spPr>
+            <a:xfrm>
+              <a:off x="5526854" y="1769479"/>
+              <a:ext cx="344966" cy="461665"/>
+            </a:xfrm>
+            <a:prstGeom prst="rect">
+              <a:avLst/>
+            </a:prstGeom>
+            <a:noFill/>
+          </p:spPr>
+          <p:txBody>
+            <a:bodyPr wrap="none" rtlCol="0">
+              <a:spAutoFit/>
+            </a:bodyPr>
+            <a:lstStyle/>
+            <a:p>
+              <a:r>
+                <a:rPr lang="en-US" sz="2400" dirty="0" smtClean="0"/>
+                <a:t>X</a:t>
+              </a:r>
+              <a:endParaRPr lang="en-US" sz="2400" dirty="0"/>
+            </a:p>
+          </p:txBody>
+        </p:sp>
+        <p:sp>
+          <p:nvSpPr>
+            <p:cNvPr id="65" name="TextBox 64"/>
+            <p:cNvSpPr txBox="1"/>
+            <p:nvPr/>
+          </p:nvSpPr>
+          <p:spPr>
+            <a:xfrm>
+              <a:off x="6544603" y="799580"/>
+              <a:ext cx="335348" cy="461665"/>
+            </a:xfrm>
+            <a:prstGeom prst="rect">
+              <a:avLst/>
+            </a:prstGeom>
+            <a:noFill/>
+          </p:spPr>
+          <p:txBody>
+            <a:bodyPr wrap="none" rtlCol="0">
+              <a:spAutoFit/>
+            </a:bodyPr>
+            <a:lstStyle/>
+            <a:p>
+              <a:r>
+                <a:rPr lang="en-US" sz="2400" dirty="0" smtClean="0"/>
+                <a:t>Y</a:t>
+              </a:r>
+              <a:endParaRPr lang="en-US" sz="2400" dirty="0"/>
+            </a:p>
+          </p:txBody>
+        </p:sp>
+      </p:grpSp>
     </p:spTree>
     <p:extLst>
       <p:ext uri="{BB962C8B-B14F-4D97-AF65-F5344CB8AC3E}">
         <p14:creationId xmlns:p14="http://schemas.microsoft.com/office/powerpoint/2010/main" val="3714895925"/>
-      </p:ext>
-    </p:extLst>
-  </p:cSld>
-  <p:clrMapOvr>
-    <a:masterClrMapping/>
-  </p:clrMapOvr>
-</p:sld>
-</file>
-
-<file path=ppt/slides/slide9.xml><?xml version="1.0" encoding="utf-8"?>
-<p:sld xmlns:a="http://schemas.openxmlformats.org/drawingml/2006/main" xmlns:r="http://schemas.openxmlformats.org/officeDocument/2006/relationships" xmlns:p="http://schemas.openxmlformats.org/presentationml/2006/main">
-  <p:cSld>
-    <p:spTree>
-      <p:nvGrpSpPr>
-        <p:cNvPr id="1" name=""/>
-        <p:cNvGrpSpPr/>
-        <p:nvPr/>
-      </p:nvGrpSpPr>
-      <p:grpSpPr>
-        <a:xfrm>
-          <a:off x="0" y="0"/>
-          <a:ext cx="0" cy="0"/>
-          <a:chOff x="0" y="0"/>
-          <a:chExt cx="0" cy="0"/>
-        </a:xfrm>
-      </p:grpSpPr>
-      <p:sp>
-        <p:nvSpPr>
-          <p:cNvPr id="4" name="Rectangle 3"/>
-          <p:cNvSpPr/>
-          <p:nvPr/>
-        </p:nvSpPr>
-        <p:spPr>
-          <a:xfrm>
-            <a:off x="3410465" y="1721708"/>
-            <a:ext cx="1581665" cy="691978"/>
-          </a:xfrm>
-          <a:prstGeom prst="rect">
-            <a:avLst/>
-          </a:prstGeom>
-        </p:spPr>
-        <p:style>
-          <a:lnRef idx="2">
-            <a:schemeClr val="accent1">
-              <a:shade val="50000"/>
-            </a:schemeClr>
-          </a:lnRef>
-          <a:fillRef idx="1">
-            <a:schemeClr val="accent1"/>
-          </a:fillRef>
-          <a:effectRef idx="0">
-            <a:schemeClr val="accent1"/>
-          </a:effectRef>
-          <a:fontRef idx="minor">
-            <a:schemeClr val="lt1"/>
-          </a:fontRef>
-        </p:style>
-        <p:txBody>
-          <a:bodyPr rtlCol="0" anchor="ctr"/>
-          <a:lstStyle/>
-          <a:p>
-            <a:pPr algn="ctr"/>
-            <a:r>
-              <a:rPr lang="en-US" dirty="0" smtClean="0"/>
-              <a:t>Board Representor</a:t>
-            </a:r>
-            <a:endParaRPr lang="en-US" dirty="0"/>
-          </a:p>
-        </p:txBody>
-      </p:sp>
-      <p:sp>
-        <p:nvSpPr>
-          <p:cNvPr id="5" name="Rectangle 4"/>
-          <p:cNvSpPr/>
-          <p:nvPr/>
-        </p:nvSpPr>
-        <p:spPr>
-          <a:xfrm>
-            <a:off x="3410464" y="2846173"/>
-            <a:ext cx="1581665" cy="691978"/>
-          </a:xfrm>
-          <a:prstGeom prst="rect">
-            <a:avLst/>
-          </a:prstGeom>
-        </p:spPr>
-        <p:style>
-          <a:lnRef idx="2">
-            <a:schemeClr val="accent1">
-              <a:shade val="50000"/>
-            </a:schemeClr>
-          </a:lnRef>
-          <a:fillRef idx="1">
-            <a:schemeClr val="accent1"/>
-          </a:fillRef>
-          <a:effectRef idx="0">
-            <a:schemeClr val="accent1"/>
-          </a:effectRef>
-          <a:fontRef idx="minor">
-            <a:schemeClr val="lt1"/>
-          </a:fontRef>
-        </p:style>
-        <p:txBody>
-          <a:bodyPr rtlCol="0" anchor="ctr"/>
-          <a:lstStyle/>
-          <a:p>
-            <a:pPr algn="ctr"/>
-            <a:r>
-              <a:rPr lang="en-US" dirty="0" smtClean="0"/>
-              <a:t>Main Processor</a:t>
-            </a:r>
-            <a:endParaRPr lang="en-US" dirty="0"/>
-          </a:p>
-        </p:txBody>
-      </p:sp>
-      <p:sp>
-        <p:nvSpPr>
-          <p:cNvPr id="6" name="Rectangle 5"/>
-          <p:cNvSpPr/>
-          <p:nvPr/>
-        </p:nvSpPr>
-        <p:spPr>
-          <a:xfrm>
-            <a:off x="3410464" y="4077729"/>
-            <a:ext cx="1581665" cy="691978"/>
-          </a:xfrm>
-          <a:prstGeom prst="rect">
-            <a:avLst/>
-          </a:prstGeom>
-        </p:spPr>
-        <p:style>
-          <a:lnRef idx="2">
-            <a:schemeClr val="accent1">
-              <a:shade val="50000"/>
-            </a:schemeClr>
-          </a:lnRef>
-          <a:fillRef idx="1">
-            <a:schemeClr val="accent1"/>
-          </a:fillRef>
-          <a:effectRef idx="0">
-            <a:schemeClr val="accent1"/>
-          </a:effectRef>
-          <a:fontRef idx="minor">
-            <a:schemeClr val="lt1"/>
-          </a:fontRef>
-        </p:style>
-        <p:txBody>
-          <a:bodyPr rtlCol="0" anchor="ctr"/>
-          <a:lstStyle/>
-          <a:p>
-            <a:pPr algn="ctr"/>
-            <a:r>
-              <a:rPr lang="en-US" dirty="0" smtClean="0"/>
-              <a:t>Move Translator</a:t>
-            </a:r>
-            <a:endParaRPr lang="en-US" dirty="0"/>
-          </a:p>
-        </p:txBody>
-      </p:sp>
-      <p:sp>
-        <p:nvSpPr>
-          <p:cNvPr id="7" name="Rectangle 6"/>
-          <p:cNvSpPr/>
-          <p:nvPr/>
-        </p:nvSpPr>
-        <p:spPr>
-          <a:xfrm>
-            <a:off x="3410464" y="5309285"/>
-            <a:ext cx="1581665" cy="691978"/>
-          </a:xfrm>
-          <a:prstGeom prst="rect">
-            <a:avLst/>
-          </a:prstGeom>
-        </p:spPr>
-        <p:style>
-          <a:lnRef idx="2">
-            <a:schemeClr val="accent1">
-              <a:shade val="50000"/>
-            </a:schemeClr>
-          </a:lnRef>
-          <a:fillRef idx="1">
-            <a:schemeClr val="accent1"/>
-          </a:fillRef>
-          <a:effectRef idx="0">
-            <a:schemeClr val="accent1"/>
-          </a:effectRef>
-          <a:fontRef idx="minor">
-            <a:schemeClr val="lt1"/>
-          </a:fontRef>
-        </p:style>
-        <p:txBody>
-          <a:bodyPr rtlCol="0" anchor="ctr"/>
-          <a:lstStyle/>
-          <a:p>
-            <a:pPr algn="ctr"/>
-            <a:r>
-              <a:rPr lang="en-US" dirty="0" smtClean="0"/>
-              <a:t>Output</a:t>
-            </a:r>
-          </a:p>
-          <a:p>
-            <a:pPr algn="ctr"/>
-            <a:r>
-              <a:rPr lang="en-US" dirty="0" smtClean="0"/>
-              <a:t>Command</a:t>
-            </a:r>
-            <a:endParaRPr lang="en-US" dirty="0"/>
-          </a:p>
-        </p:txBody>
-      </p:sp>
-      <p:sp>
-        <p:nvSpPr>
-          <p:cNvPr id="8" name="Rectangle 7"/>
-          <p:cNvSpPr/>
-          <p:nvPr/>
-        </p:nvSpPr>
-        <p:spPr>
-          <a:xfrm>
-            <a:off x="3410464" y="467498"/>
-            <a:ext cx="1581665" cy="691978"/>
-          </a:xfrm>
-          <a:prstGeom prst="rect">
-            <a:avLst/>
-          </a:prstGeom>
-        </p:spPr>
-        <p:style>
-          <a:lnRef idx="2">
-            <a:schemeClr val="accent1">
-              <a:shade val="50000"/>
-            </a:schemeClr>
-          </a:lnRef>
-          <a:fillRef idx="1">
-            <a:schemeClr val="accent1"/>
-          </a:fillRef>
-          <a:effectRef idx="0">
-            <a:schemeClr val="accent1"/>
-          </a:effectRef>
-          <a:fontRef idx="minor">
-            <a:schemeClr val="lt1"/>
-          </a:fontRef>
-        </p:style>
-        <p:txBody>
-          <a:bodyPr rtlCol="0" anchor="ctr"/>
-          <a:lstStyle/>
-          <a:p>
-            <a:pPr algn="ctr"/>
-            <a:r>
-              <a:rPr lang="en-US" dirty="0" smtClean="0"/>
-              <a:t>Input</a:t>
-            </a:r>
-          </a:p>
-          <a:p>
-            <a:pPr algn="ctr"/>
-            <a:r>
-              <a:rPr lang="en-US" dirty="0" smtClean="0"/>
-              <a:t>Command</a:t>
-            </a:r>
-            <a:endParaRPr lang="en-US" dirty="0"/>
-          </a:p>
-        </p:txBody>
-      </p:sp>
-      <p:sp>
-        <p:nvSpPr>
-          <p:cNvPr id="9" name="Rectangle 8"/>
-          <p:cNvSpPr/>
-          <p:nvPr/>
-        </p:nvSpPr>
-        <p:spPr>
-          <a:xfrm>
-            <a:off x="6100118" y="2846173"/>
-            <a:ext cx="1581665" cy="691978"/>
-          </a:xfrm>
-          <a:prstGeom prst="rect">
-            <a:avLst/>
-          </a:prstGeom>
-        </p:spPr>
-        <p:style>
-          <a:lnRef idx="2">
-            <a:schemeClr val="accent1">
-              <a:shade val="50000"/>
-            </a:schemeClr>
-          </a:lnRef>
-          <a:fillRef idx="1">
-            <a:schemeClr val="accent1"/>
-          </a:fillRef>
-          <a:effectRef idx="0">
-            <a:schemeClr val="accent1"/>
-          </a:effectRef>
-          <a:fontRef idx="minor">
-            <a:schemeClr val="lt1"/>
-          </a:fontRef>
-        </p:style>
-        <p:txBody>
-          <a:bodyPr rtlCol="0" anchor="ctr"/>
-          <a:lstStyle/>
-          <a:p>
-            <a:pPr algn="ctr"/>
-            <a:r>
-              <a:rPr lang="en-US" dirty="0" smtClean="0"/>
-              <a:t>RAM</a:t>
-            </a:r>
-            <a:endParaRPr lang="en-US" dirty="0"/>
-          </a:p>
-        </p:txBody>
-      </p:sp>
-      <p:cxnSp>
-        <p:nvCxnSpPr>
-          <p:cNvPr id="11" name="Straight Arrow Connector 10"/>
-          <p:cNvCxnSpPr>
-            <a:stCxn id="8" idx="2"/>
-            <a:endCxn id="4" idx="0"/>
-          </p:cNvCxnSpPr>
-          <p:nvPr/>
-        </p:nvCxnSpPr>
-        <p:spPr>
-          <a:xfrm>
-            <a:off x="4201297" y="1159476"/>
-            <a:ext cx="1" cy="562232"/>
-          </a:xfrm>
-          <a:prstGeom prst="straightConnector1">
-            <a:avLst/>
-          </a:prstGeom>
-          <a:ln>
-            <a:tailEnd type="triangle"/>
-          </a:ln>
-        </p:spPr>
-        <p:style>
-          <a:lnRef idx="1">
-            <a:schemeClr val="accent1"/>
-          </a:lnRef>
-          <a:fillRef idx="0">
-            <a:schemeClr val="accent1"/>
-          </a:fillRef>
-          <a:effectRef idx="0">
-            <a:schemeClr val="accent1"/>
-          </a:effectRef>
-          <a:fontRef idx="minor">
-            <a:schemeClr val="tx1"/>
-          </a:fontRef>
-        </p:style>
-      </p:cxnSp>
-      <p:cxnSp>
-        <p:nvCxnSpPr>
-          <p:cNvPr id="15" name="Straight Arrow Connector 14"/>
-          <p:cNvCxnSpPr>
-            <a:stCxn id="5" idx="2"/>
-            <a:endCxn id="6" idx="0"/>
-          </p:cNvCxnSpPr>
-          <p:nvPr/>
-        </p:nvCxnSpPr>
-        <p:spPr>
-          <a:xfrm>
-            <a:off x="4201297" y="3538151"/>
-            <a:ext cx="0" cy="539578"/>
-          </a:xfrm>
-          <a:prstGeom prst="straightConnector1">
-            <a:avLst/>
-          </a:prstGeom>
-          <a:ln>
-            <a:tailEnd type="triangle"/>
-          </a:ln>
-        </p:spPr>
-        <p:style>
-          <a:lnRef idx="1">
-            <a:schemeClr val="accent1"/>
-          </a:lnRef>
-          <a:fillRef idx="0">
-            <a:schemeClr val="accent1"/>
-          </a:fillRef>
-          <a:effectRef idx="0">
-            <a:schemeClr val="accent1"/>
-          </a:effectRef>
-          <a:fontRef idx="minor">
-            <a:schemeClr val="tx1"/>
-          </a:fontRef>
-        </p:style>
-      </p:cxnSp>
-      <p:cxnSp>
-        <p:nvCxnSpPr>
-          <p:cNvPr id="17" name="Straight Arrow Connector 16"/>
-          <p:cNvCxnSpPr>
-            <a:stCxn id="6" idx="2"/>
-            <a:endCxn id="7" idx="0"/>
-          </p:cNvCxnSpPr>
-          <p:nvPr/>
-        </p:nvCxnSpPr>
-        <p:spPr>
-          <a:xfrm>
-            <a:off x="4201297" y="4769707"/>
-            <a:ext cx="0" cy="539578"/>
-          </a:xfrm>
-          <a:prstGeom prst="straightConnector1">
-            <a:avLst/>
-          </a:prstGeom>
-          <a:ln>
-            <a:tailEnd type="triangle"/>
-          </a:ln>
-        </p:spPr>
-        <p:style>
-          <a:lnRef idx="1">
-            <a:schemeClr val="accent1"/>
-          </a:lnRef>
-          <a:fillRef idx="0">
-            <a:schemeClr val="accent1"/>
-          </a:fillRef>
-          <a:effectRef idx="0">
-            <a:schemeClr val="accent1"/>
-          </a:effectRef>
-          <a:fontRef idx="minor">
-            <a:schemeClr val="tx1"/>
-          </a:fontRef>
-        </p:style>
-      </p:cxnSp>
-      <p:cxnSp>
-        <p:nvCxnSpPr>
-          <p:cNvPr id="19" name="Straight Arrow Connector 18"/>
-          <p:cNvCxnSpPr>
-            <a:stCxn id="9" idx="1"/>
-            <a:endCxn id="5" idx="3"/>
-          </p:cNvCxnSpPr>
-          <p:nvPr/>
-        </p:nvCxnSpPr>
-        <p:spPr>
-          <a:xfrm flipH="1">
-            <a:off x="4992129" y="3192162"/>
-            <a:ext cx="1107989" cy="0"/>
-          </a:xfrm>
-          <a:prstGeom prst="straightConnector1">
-            <a:avLst/>
-          </a:prstGeom>
-          <a:ln>
-            <a:tailEnd type="triangle"/>
-          </a:ln>
-        </p:spPr>
-        <p:style>
-          <a:lnRef idx="1">
-            <a:schemeClr val="accent1"/>
-          </a:lnRef>
-          <a:fillRef idx="0">
-            <a:schemeClr val="accent1"/>
-          </a:fillRef>
-          <a:effectRef idx="0">
-            <a:schemeClr val="accent1"/>
-          </a:effectRef>
-          <a:fontRef idx="minor">
-            <a:schemeClr val="tx1"/>
-          </a:fontRef>
-        </p:style>
-      </p:cxnSp>
-      <p:cxnSp>
-        <p:nvCxnSpPr>
-          <p:cNvPr id="21" name="Straight Arrow Connector 20"/>
-          <p:cNvCxnSpPr>
-            <a:stCxn id="4" idx="2"/>
-            <a:endCxn id="5" idx="0"/>
-          </p:cNvCxnSpPr>
-          <p:nvPr/>
-        </p:nvCxnSpPr>
-        <p:spPr>
-          <a:xfrm flipH="1">
-            <a:off x="4201297" y="2413686"/>
-            <a:ext cx="1" cy="432487"/>
-          </a:xfrm>
-          <a:prstGeom prst="straightConnector1">
-            <a:avLst/>
-          </a:prstGeom>
-          <a:ln>
-            <a:tailEnd type="triangle"/>
-          </a:ln>
-        </p:spPr>
-        <p:style>
-          <a:lnRef idx="1">
-            <a:schemeClr val="accent1"/>
-          </a:lnRef>
-          <a:fillRef idx="0">
-            <a:schemeClr val="accent1"/>
-          </a:fillRef>
-          <a:effectRef idx="0">
-            <a:schemeClr val="accent1"/>
-          </a:effectRef>
-          <a:fontRef idx="minor">
-            <a:schemeClr val="tx1"/>
-          </a:fontRef>
-        </p:style>
-      </p:cxnSp>
-    </p:spTree>
-    <p:extLst>
-      <p:ext uri="{BB962C8B-B14F-4D97-AF65-F5344CB8AC3E}">
-        <p14:creationId xmlns:p14="http://schemas.microsoft.com/office/powerpoint/2010/main" val="3134242800"/>
       </p:ext>
     </p:extLst>
   </p:cSld>

</xml_diff>